<commit_message>
pk toegevoegd aan materiaal in erd ma duidekijk zichtbaar
</commit_message>
<xml_diff>
--- a/Presentatie datamodelering.pptx
+++ b/Presentatie datamodelering.pptx
@@ -257,7 +257,7 @@
           <a:p>
             <a:fld id="{66D99592-BC2C-9548-86B6-DB984F76454D}" type="datetimeFigureOut">
               <a:rPr lang="nl-BE"/>
-              <a:t>13/12/2017</a:t>
+              <a:t>18/05/2018</a:t>
             </a:fld>
             <a:endParaRPr lang="nl-BE"/>
           </a:p>
@@ -457,7 +457,7 @@
           <a:p>
             <a:fld id="{66D99592-BC2C-9548-86B6-DB984F76454D}" type="datetimeFigureOut">
               <a:rPr lang="nl-BE"/>
-              <a:t>13/12/2017</a:t>
+              <a:t>18/05/2018</a:t>
             </a:fld>
             <a:endParaRPr lang="nl-BE"/>
           </a:p>
@@ -667,7 +667,7 @@
           <a:p>
             <a:fld id="{66D99592-BC2C-9548-86B6-DB984F76454D}" type="datetimeFigureOut">
               <a:rPr lang="nl-BE"/>
-              <a:t>13/12/2017</a:t>
+              <a:t>18/05/2018</a:t>
             </a:fld>
             <a:endParaRPr lang="nl-BE"/>
           </a:p>
@@ -867,7 +867,7 @@
           <a:p>
             <a:fld id="{66D99592-BC2C-9548-86B6-DB984F76454D}" type="datetimeFigureOut">
               <a:rPr lang="nl-BE"/>
-              <a:t>13/12/2017</a:t>
+              <a:t>18/05/2018</a:t>
             </a:fld>
             <a:endParaRPr lang="nl-BE"/>
           </a:p>
@@ -1143,7 +1143,7 @@
           <a:p>
             <a:fld id="{66D99592-BC2C-9548-86B6-DB984F76454D}" type="datetimeFigureOut">
               <a:rPr lang="nl-BE"/>
-              <a:t>13/12/2017</a:t>
+              <a:t>18/05/2018</a:t>
             </a:fld>
             <a:endParaRPr lang="nl-BE"/>
           </a:p>
@@ -1411,7 +1411,7 @@
           <a:p>
             <a:fld id="{66D99592-BC2C-9548-86B6-DB984F76454D}" type="datetimeFigureOut">
               <a:rPr lang="nl-BE"/>
-              <a:t>13/12/2017</a:t>
+              <a:t>18/05/2018</a:t>
             </a:fld>
             <a:endParaRPr lang="nl-BE"/>
           </a:p>
@@ -1826,7 +1826,7 @@
           <a:p>
             <a:fld id="{66D99592-BC2C-9548-86B6-DB984F76454D}" type="datetimeFigureOut">
               <a:rPr lang="nl-BE"/>
-              <a:t>13/12/2017</a:t>
+              <a:t>18/05/2018</a:t>
             </a:fld>
             <a:endParaRPr lang="nl-BE"/>
           </a:p>
@@ -1968,7 +1968,7 @@
           <a:p>
             <a:fld id="{66D99592-BC2C-9548-86B6-DB984F76454D}" type="datetimeFigureOut">
               <a:rPr lang="nl-BE"/>
-              <a:t>13/12/2017</a:t>
+              <a:t>18/05/2018</a:t>
             </a:fld>
             <a:endParaRPr lang="nl-BE"/>
           </a:p>
@@ -2081,7 +2081,7 @@
           <a:p>
             <a:fld id="{66D99592-BC2C-9548-86B6-DB984F76454D}" type="datetimeFigureOut">
               <a:rPr lang="nl-BE"/>
-              <a:t>13/12/2017</a:t>
+              <a:t>18/05/2018</a:t>
             </a:fld>
             <a:endParaRPr lang="nl-BE"/>
           </a:p>
@@ -2394,7 +2394,7 @@
           <a:p>
             <a:fld id="{66D99592-BC2C-9548-86B6-DB984F76454D}" type="datetimeFigureOut">
               <a:rPr lang="nl-BE"/>
-              <a:t>13/12/2017</a:t>
+              <a:t>18/05/2018</a:t>
             </a:fld>
             <a:endParaRPr lang="nl-BE"/>
           </a:p>
@@ -2683,7 +2683,7 @@
           <a:p>
             <a:fld id="{66D99592-BC2C-9548-86B6-DB984F76454D}" type="datetimeFigureOut">
               <a:rPr lang="nl-BE"/>
-              <a:t>13/12/2017</a:t>
+              <a:t>18/05/2018</a:t>
             </a:fld>
             <a:endParaRPr lang="nl-BE"/>
           </a:p>
@@ -2926,7 +2926,7 @@
           <a:p>
             <a:fld id="{66D99592-BC2C-9548-86B6-DB984F76454D}" type="datetimeFigureOut">
               <a:rPr lang="nl-BE"/>
-              <a:t>13/12/2017</a:t>
+              <a:t>18/05/2018</a:t>
             </a:fld>
             <a:endParaRPr lang="nl-BE"/>
           </a:p>
@@ -3380,31 +3380,6 @@
           </a:p>
         </p:txBody>
       </p:sp>
-      <p:sp>
-        <p:nvSpPr>
-          <p:cNvPr id="3" name="Ondertitel 2">
-            <a:extLst>
-              <a:ext uri="{FF2B5EF4-FFF2-40B4-BE49-F238E27FC236}">
-                <a16:creationId xmlns:a16="http://schemas.microsoft.com/office/drawing/2014/main" id="{5154AEDE-CCEC-8749-B4D3-533AF88542A0}"/>
-              </a:ext>
-            </a:extLst>
-          </p:cNvPr>
-          <p:cNvSpPr>
-            <a:spLocks noGrp="1"/>
-          </p:cNvSpPr>
-          <p:nvPr>
-            <p:ph type="subTitle" idx="1"/>
-          </p:nvPr>
-        </p:nvSpPr>
-        <p:spPr/>
-        <p:txBody>
-          <a:bodyPr/>
-          <a:lstStyle/>
-          <a:p>
-            <a:endParaRPr lang="nl-BE"/>
-          </a:p>
-        </p:txBody>
-      </p:sp>
       <p:pic>
         <p:nvPicPr>
           <p:cNvPr id="4" name="Afbeelding 4">
@@ -3433,14 +3408,103 @@
         </p:blipFill>
         <p:spPr>
           <a:xfrm>
-            <a:off x="1674813" y="2137190"/>
+            <a:off x="1617663" y="1927640"/>
             <a:ext cx="8128000" cy="3799646"/>
           </a:xfrm>
           <a:prstGeom prst="rect">
             <a:avLst/>
           </a:prstGeom>
+          <a:solidFill>
+            <a:schemeClr val="bg1"/>
+          </a:solidFill>
         </p:spPr>
       </p:pic>
+      <p:sp>
+        <p:nvSpPr>
+          <p:cNvPr id="6" name="Rechthoek 5">
+            <a:extLst>
+              <a:ext uri="{FF2B5EF4-FFF2-40B4-BE49-F238E27FC236}">
+                <a16:creationId xmlns:a16="http://schemas.microsoft.com/office/drawing/2014/main" id="{6942BD59-9D53-49BF-832B-434363170C90}"/>
+              </a:ext>
+            </a:extLst>
+          </p:cNvPr>
+          <p:cNvSpPr/>
+          <p:nvPr/>
+        </p:nvSpPr>
+        <p:spPr>
+          <a:xfrm>
+            <a:off x="5745055" y="3133977"/>
+            <a:ext cx="842630" cy="295023"/>
+          </a:xfrm>
+          <a:prstGeom prst="rect">
+            <a:avLst/>
+          </a:prstGeom>
+        </p:spPr>
+        <p:style>
+          <a:lnRef idx="2">
+            <a:schemeClr val="dk1"/>
+          </a:lnRef>
+          <a:fillRef idx="1">
+            <a:schemeClr val="lt1"/>
+          </a:fillRef>
+          <a:effectRef idx="0">
+            <a:schemeClr val="dk1"/>
+          </a:effectRef>
+          <a:fontRef idx="minor">
+            <a:schemeClr val="dk1"/>
+          </a:fontRef>
+        </p:style>
+        <p:txBody>
+          <a:bodyPr rtlCol="0" anchor="ctr"/>
+          <a:lstStyle/>
+          <a:p>
+            <a:pPr algn="ctr"/>
+            <a:endParaRPr lang="nl-BE"/>
+          </a:p>
+        </p:txBody>
+      </p:sp>
+      <p:sp>
+        <p:nvSpPr>
+          <p:cNvPr id="5" name="Tekstvak 4">
+            <a:extLst>
+              <a:ext uri="{FF2B5EF4-FFF2-40B4-BE49-F238E27FC236}">
+                <a16:creationId xmlns:a16="http://schemas.microsoft.com/office/drawing/2014/main" id="{0CC32F70-374B-4707-A7BD-8BFE00636375}"/>
+              </a:ext>
+            </a:extLst>
+          </p:cNvPr>
+          <p:cNvSpPr txBox="1"/>
+          <p:nvPr/>
+        </p:nvSpPr>
+        <p:spPr>
+          <a:xfrm>
+            <a:off x="5792300" y="3112211"/>
+            <a:ext cx="742950" cy="338554"/>
+          </a:xfrm>
+          <a:prstGeom prst="rect">
+            <a:avLst/>
+          </a:prstGeom>
+          <a:noFill/>
+        </p:spPr>
+        <p:txBody>
+          <a:bodyPr wrap="square" rtlCol="0">
+            <a:spAutoFit/>
+          </a:bodyPr>
+          <a:lstStyle/>
+          <a:p>
+            <a:r>
+              <a:rPr lang="nl-BE" sz="800" dirty="0" err="1"/>
+              <a:t>Id_materiaal</a:t>
+            </a:r>
+            <a:endParaRPr lang="nl-BE" sz="800" dirty="0"/>
+          </a:p>
+          <a:p>
+            <a:r>
+              <a:rPr lang="nl-BE" sz="800" dirty="0"/>
+              <a:t>omschrijving</a:t>
+            </a:r>
+          </a:p>
+        </p:txBody>
+      </p:sp>
     </p:spTree>
     <p:extLst>
       <p:ext uri="{BB962C8B-B14F-4D97-AF65-F5344CB8AC3E}">

</xml_diff>